<commit_message>
partner figures to squares
</commit_message>
<xml_diff>
--- a/assets/images/partners/ras.pptx
+++ b/assets/images/partners/ras.pptx
@@ -6,6 +6,11 @@
   </p:sldMasterIdLst>
   <p:sldIdLst>
     <p:sldId id="256" r:id="rId2"/>
+    <p:sldId id="257" r:id="rId3"/>
+    <p:sldId id="258" r:id="rId4"/>
+    <p:sldId id="259" r:id="rId5"/>
+    <p:sldId id="260" r:id="rId6"/>
+    <p:sldId id="261" r:id="rId7"/>
   </p:sldIdLst>
   <p:sldSz cx="7199313" cy="7199313"/>
   <p:notesSz cx="6858000" cy="9144000"/>
@@ -104,6 +109,11 @@
       </a:defRPr>
     </a:lvl9pPr>
   </p:defaultTextStyle>
+  <p:extLst>
+    <p:ext uri="{EFAFB233-063F-42B5-8137-9DF3F51BA10A}">
+      <p15:sldGuideLst xmlns:p15="http://schemas.microsoft.com/office/powerpoint/2012/main"/>
+    </p:ext>
+  </p:extLst>
 </p:presentation>
 </file>
 
@@ -238,7 +248,7 @@
           <a:p>
             <a:fld id="{393B787C-80ED-4936-9BF5-D72B563714FC}" type="datetimeFigureOut">
               <a:rPr lang="en-US" smtClean="0"/>
-              <a:t>18-Jun-21</a:t>
+              <a:t>9/10/2021</a:t>
             </a:fld>
             <a:endParaRPr lang="en-US"/>
           </a:p>
@@ -408,7 +418,7 @@
           <a:p>
             <a:fld id="{393B787C-80ED-4936-9BF5-D72B563714FC}" type="datetimeFigureOut">
               <a:rPr lang="en-US" smtClean="0"/>
-              <a:t>18-Jun-21</a:t>
+              <a:t>9/10/2021</a:t>
             </a:fld>
             <a:endParaRPr lang="en-US"/>
           </a:p>
@@ -588,7 +598,7 @@
           <a:p>
             <a:fld id="{393B787C-80ED-4936-9BF5-D72B563714FC}" type="datetimeFigureOut">
               <a:rPr lang="en-US" smtClean="0"/>
-              <a:t>18-Jun-21</a:t>
+              <a:t>9/10/2021</a:t>
             </a:fld>
             <a:endParaRPr lang="en-US"/>
           </a:p>
@@ -758,7 +768,7 @@
           <a:p>
             <a:fld id="{393B787C-80ED-4936-9BF5-D72B563714FC}" type="datetimeFigureOut">
               <a:rPr lang="en-US" smtClean="0"/>
-              <a:t>18-Jun-21</a:t>
+              <a:t>9/10/2021</a:t>
             </a:fld>
             <a:endParaRPr lang="en-US"/>
           </a:p>
@@ -1002,7 +1012,7 @@
           <a:p>
             <a:fld id="{393B787C-80ED-4936-9BF5-D72B563714FC}" type="datetimeFigureOut">
               <a:rPr lang="en-US" smtClean="0"/>
-              <a:t>18-Jun-21</a:t>
+              <a:t>9/10/2021</a:t>
             </a:fld>
             <a:endParaRPr lang="en-US"/>
           </a:p>
@@ -1234,7 +1244,7 @@
           <a:p>
             <a:fld id="{393B787C-80ED-4936-9BF5-D72B563714FC}" type="datetimeFigureOut">
               <a:rPr lang="en-US" smtClean="0"/>
-              <a:t>18-Jun-21</a:t>
+              <a:t>9/10/2021</a:t>
             </a:fld>
             <a:endParaRPr lang="en-US"/>
           </a:p>
@@ -1601,7 +1611,7 @@
           <a:p>
             <a:fld id="{393B787C-80ED-4936-9BF5-D72B563714FC}" type="datetimeFigureOut">
               <a:rPr lang="en-US" smtClean="0"/>
-              <a:t>18-Jun-21</a:t>
+              <a:t>9/10/2021</a:t>
             </a:fld>
             <a:endParaRPr lang="en-US"/>
           </a:p>
@@ -1719,7 +1729,7 @@
           <a:p>
             <a:fld id="{393B787C-80ED-4936-9BF5-D72B563714FC}" type="datetimeFigureOut">
               <a:rPr lang="en-US" smtClean="0"/>
-              <a:t>18-Jun-21</a:t>
+              <a:t>9/10/2021</a:t>
             </a:fld>
             <a:endParaRPr lang="en-US"/>
           </a:p>
@@ -1814,7 +1824,7 @@
           <a:p>
             <a:fld id="{393B787C-80ED-4936-9BF5-D72B563714FC}" type="datetimeFigureOut">
               <a:rPr lang="en-US" smtClean="0"/>
-              <a:t>18-Jun-21</a:t>
+              <a:t>9/10/2021</a:t>
             </a:fld>
             <a:endParaRPr lang="en-US"/>
           </a:p>
@@ -2091,7 +2101,7 @@
           <a:p>
             <a:fld id="{393B787C-80ED-4936-9BF5-D72B563714FC}" type="datetimeFigureOut">
               <a:rPr lang="en-US" smtClean="0"/>
-              <a:t>18-Jun-21</a:t>
+              <a:t>9/10/2021</a:t>
             </a:fld>
             <a:endParaRPr lang="en-US"/>
           </a:p>
@@ -2348,7 +2358,7 @@
           <a:p>
             <a:fld id="{393B787C-80ED-4936-9BF5-D72B563714FC}" type="datetimeFigureOut">
               <a:rPr lang="en-US" smtClean="0"/>
-              <a:t>18-Jun-21</a:t>
+              <a:t>9/10/2021</a:t>
             </a:fld>
             <a:endParaRPr lang="en-US"/>
           </a:p>
@@ -2561,7 +2571,7 @@
           <a:p>
             <a:fld id="{393B787C-80ED-4936-9BF5-D72B563714FC}" type="datetimeFigureOut">
               <a:rPr lang="en-US" smtClean="0"/>
-              <a:t>18-Jun-21</a:t>
+              <a:t>9/10/2021</a:t>
             </a:fld>
             <a:endParaRPr lang="en-US"/>
           </a:p>
@@ -3023,6 +3033,296 @@
 </p:sld>
 </file>
 
+<file path=ppt/slides/slide2.xml><?xml version="1.0" encoding="utf-8"?>
+<p:sld xmlns:a="http://schemas.openxmlformats.org/drawingml/2006/main" xmlns:r="http://schemas.openxmlformats.org/officeDocument/2006/relationships" xmlns:p="http://schemas.openxmlformats.org/presentationml/2006/main">
+  <p:cSld>
+    <p:spTree>
+      <p:nvGrpSpPr>
+        <p:cNvPr id="1" name=""/>
+        <p:cNvGrpSpPr/>
+        <p:nvPr/>
+      </p:nvGrpSpPr>
+      <p:grpSpPr>
+        <a:xfrm>
+          <a:off x="0" y="0"/>
+          <a:ext cx="0" cy="0"/>
+          <a:chOff x="0" y="0"/>
+          <a:chExt cx="0" cy="0"/>
+        </a:xfrm>
+      </p:grpSpPr>
+      <p:pic>
+        <p:nvPicPr>
+          <p:cNvPr id="4" name="Content Placeholder 3"/>
+          <p:cNvPicPr>
+            <a:picLocks noGrp="1" noChangeAspect="1"/>
+          </p:cNvPicPr>
+          <p:nvPr>
+            <p:ph idx="1"/>
+          </p:nvPr>
+        </p:nvPicPr>
+        <p:blipFill>
+          <a:blip r:embed="rId2">
+            <a:extLst>
+              <a:ext uri="{28A0092B-C50C-407E-A947-70E740481C1C}">
+                <a14:useLocalDpi xmlns:a14="http://schemas.microsoft.com/office/drawing/2010/main" val="0"/>
+              </a:ext>
+            </a:extLst>
+          </a:blip>
+          <a:stretch>
+            <a:fillRect/>
+          </a:stretch>
+        </p:blipFill>
+        <p:spPr>
+          <a:xfrm>
+            <a:off x="495300" y="1450256"/>
+            <a:ext cx="6208713" cy="4298800"/>
+          </a:xfrm>
+        </p:spPr>
+      </p:pic>
+    </p:spTree>
+    <p:extLst>
+      <p:ext uri="{BB962C8B-B14F-4D97-AF65-F5344CB8AC3E}">
+        <p14:creationId xmlns:p14="http://schemas.microsoft.com/office/powerpoint/2010/main" val="2412580188"/>
+      </p:ext>
+    </p:extLst>
+  </p:cSld>
+  <p:clrMapOvr>
+    <a:masterClrMapping/>
+  </p:clrMapOvr>
+</p:sld>
+</file>
+
+<file path=ppt/slides/slide3.xml><?xml version="1.0" encoding="utf-8"?>
+<p:sld xmlns:a="http://schemas.openxmlformats.org/drawingml/2006/main" xmlns:r="http://schemas.openxmlformats.org/officeDocument/2006/relationships" xmlns:p="http://schemas.openxmlformats.org/presentationml/2006/main">
+  <p:cSld>
+    <p:spTree>
+      <p:nvGrpSpPr>
+        <p:cNvPr id="1" name=""/>
+        <p:cNvGrpSpPr/>
+        <p:nvPr/>
+      </p:nvGrpSpPr>
+      <p:grpSpPr>
+        <a:xfrm>
+          <a:off x="0" y="0"/>
+          <a:ext cx="0" cy="0"/>
+          <a:chOff x="0" y="0"/>
+          <a:chExt cx="0" cy="0"/>
+        </a:xfrm>
+      </p:grpSpPr>
+      <p:pic>
+        <p:nvPicPr>
+          <p:cNvPr id="4" name="Content Placeholder 3"/>
+          <p:cNvPicPr>
+            <a:picLocks noGrp="1" noChangeAspect="1"/>
+          </p:cNvPicPr>
+          <p:nvPr>
+            <p:ph idx="1"/>
+          </p:nvPr>
+        </p:nvPicPr>
+        <p:blipFill>
+          <a:blip r:embed="rId2">
+            <a:extLst>
+              <a:ext uri="{28A0092B-C50C-407E-A947-70E740481C1C}">
+                <a14:useLocalDpi xmlns:a14="http://schemas.microsoft.com/office/drawing/2010/main" val="0"/>
+              </a:ext>
+            </a:extLst>
+          </a:blip>
+          <a:stretch>
+            <a:fillRect/>
+          </a:stretch>
+        </p:blipFill>
+        <p:spPr>
+          <a:xfrm>
+            <a:off x="1315244" y="1315244"/>
+            <a:ext cx="4568825" cy="4568825"/>
+          </a:xfrm>
+        </p:spPr>
+      </p:pic>
+    </p:spTree>
+    <p:extLst>
+      <p:ext uri="{BB962C8B-B14F-4D97-AF65-F5344CB8AC3E}">
+        <p14:creationId xmlns:p14="http://schemas.microsoft.com/office/powerpoint/2010/main" val="1056162905"/>
+      </p:ext>
+    </p:extLst>
+  </p:cSld>
+  <p:clrMapOvr>
+    <a:masterClrMapping/>
+  </p:clrMapOvr>
+</p:sld>
+</file>
+
+<file path=ppt/slides/slide4.xml><?xml version="1.0" encoding="utf-8"?>
+<p:sld xmlns:a="http://schemas.openxmlformats.org/drawingml/2006/main" xmlns:r="http://schemas.openxmlformats.org/officeDocument/2006/relationships" xmlns:p="http://schemas.openxmlformats.org/presentationml/2006/main">
+  <p:cSld>
+    <p:spTree>
+      <p:nvGrpSpPr>
+        <p:cNvPr id="1" name=""/>
+        <p:cNvGrpSpPr/>
+        <p:nvPr/>
+      </p:nvGrpSpPr>
+      <p:grpSpPr>
+        <a:xfrm>
+          <a:off x="0" y="0"/>
+          <a:ext cx="0" cy="0"/>
+          <a:chOff x="0" y="0"/>
+          <a:chExt cx="0" cy="0"/>
+        </a:xfrm>
+      </p:grpSpPr>
+      <p:pic>
+        <p:nvPicPr>
+          <p:cNvPr id="4" name="Content Placeholder 3"/>
+          <p:cNvPicPr>
+            <a:picLocks noGrp="1" noChangeAspect="1"/>
+          </p:cNvPicPr>
+          <p:nvPr>
+            <p:ph idx="1"/>
+          </p:nvPr>
+        </p:nvPicPr>
+        <p:blipFill>
+          <a:blip r:embed="rId2" cstate="print">
+            <a:extLst>
+              <a:ext uri="{28A0092B-C50C-407E-A947-70E740481C1C}">
+                <a14:useLocalDpi xmlns:a14="http://schemas.microsoft.com/office/drawing/2010/main" val="0"/>
+              </a:ext>
+            </a:extLst>
+          </a:blip>
+          <a:stretch>
+            <a:fillRect/>
+          </a:stretch>
+        </p:blipFill>
+        <p:spPr>
+          <a:xfrm>
+            <a:off x="495300" y="2200969"/>
+            <a:ext cx="6208713" cy="2797375"/>
+          </a:xfrm>
+        </p:spPr>
+      </p:pic>
+    </p:spTree>
+    <p:extLst>
+      <p:ext uri="{BB962C8B-B14F-4D97-AF65-F5344CB8AC3E}">
+        <p14:creationId xmlns:p14="http://schemas.microsoft.com/office/powerpoint/2010/main" val="101383244"/>
+      </p:ext>
+    </p:extLst>
+  </p:cSld>
+  <p:clrMapOvr>
+    <a:masterClrMapping/>
+  </p:clrMapOvr>
+</p:sld>
+</file>
+
+<file path=ppt/slides/slide5.xml><?xml version="1.0" encoding="utf-8"?>
+<p:sld xmlns:a="http://schemas.openxmlformats.org/drawingml/2006/main" xmlns:r="http://schemas.openxmlformats.org/officeDocument/2006/relationships" xmlns:p="http://schemas.openxmlformats.org/presentationml/2006/main">
+  <p:cSld>
+    <p:spTree>
+      <p:nvGrpSpPr>
+        <p:cNvPr id="1" name=""/>
+        <p:cNvGrpSpPr/>
+        <p:nvPr/>
+      </p:nvGrpSpPr>
+      <p:grpSpPr>
+        <a:xfrm>
+          <a:off x="0" y="0"/>
+          <a:ext cx="0" cy="0"/>
+          <a:chOff x="0" y="0"/>
+          <a:chExt cx="0" cy="0"/>
+        </a:xfrm>
+      </p:grpSpPr>
+      <p:pic>
+        <p:nvPicPr>
+          <p:cNvPr id="4" name="Content Placeholder 3"/>
+          <p:cNvPicPr>
+            <a:picLocks noGrp="1" noChangeAspect="1"/>
+          </p:cNvPicPr>
+          <p:nvPr>
+            <p:ph idx="1"/>
+          </p:nvPr>
+        </p:nvPicPr>
+        <p:blipFill>
+          <a:blip r:embed="rId2" cstate="print">
+            <a:extLst>
+              <a:ext uri="{28A0092B-C50C-407E-A947-70E740481C1C}">
+                <a14:useLocalDpi xmlns:a14="http://schemas.microsoft.com/office/drawing/2010/main" val="0"/>
+              </a:ext>
+            </a:extLst>
+          </a:blip>
+          <a:stretch>
+            <a:fillRect/>
+          </a:stretch>
+        </p:blipFill>
+        <p:spPr>
+          <a:xfrm>
+            <a:off x="1315244" y="1315244"/>
+            <a:ext cx="4568825" cy="4568825"/>
+          </a:xfrm>
+        </p:spPr>
+      </p:pic>
+    </p:spTree>
+    <p:extLst>
+      <p:ext uri="{BB962C8B-B14F-4D97-AF65-F5344CB8AC3E}">
+        <p14:creationId xmlns:p14="http://schemas.microsoft.com/office/powerpoint/2010/main" val="2326679271"/>
+      </p:ext>
+    </p:extLst>
+  </p:cSld>
+  <p:clrMapOvr>
+    <a:masterClrMapping/>
+  </p:clrMapOvr>
+</p:sld>
+</file>
+
+<file path=ppt/slides/slide6.xml><?xml version="1.0" encoding="utf-8"?>
+<p:sld xmlns:a="http://schemas.openxmlformats.org/drawingml/2006/main" xmlns:r="http://schemas.openxmlformats.org/officeDocument/2006/relationships" xmlns:p="http://schemas.openxmlformats.org/presentationml/2006/main">
+  <p:cSld>
+    <p:spTree>
+      <p:nvGrpSpPr>
+        <p:cNvPr id="1" name=""/>
+        <p:cNvGrpSpPr/>
+        <p:nvPr/>
+      </p:nvGrpSpPr>
+      <p:grpSpPr>
+        <a:xfrm>
+          <a:off x="0" y="0"/>
+          <a:ext cx="0" cy="0"/>
+          <a:chOff x="0" y="0"/>
+          <a:chExt cx="0" cy="0"/>
+        </a:xfrm>
+      </p:grpSpPr>
+      <p:pic>
+        <p:nvPicPr>
+          <p:cNvPr id="11" name="Picture 10"/>
+          <p:cNvPicPr>
+            <a:picLocks noChangeAspect="1"/>
+          </p:cNvPicPr>
+          <p:nvPr/>
+        </p:nvPicPr>
+        <p:blipFill>
+          <a:blip r:embed="rId2"/>
+          <a:stretch>
+            <a:fillRect/>
+          </a:stretch>
+        </p:blipFill>
+        <p:spPr>
+          <a:xfrm>
+            <a:off x="383403" y="2448595"/>
+            <a:ext cx="6432507" cy="2302123"/>
+          </a:xfrm>
+          <a:prstGeom prst="rect">
+            <a:avLst/>
+          </a:prstGeom>
+        </p:spPr>
+      </p:pic>
+    </p:spTree>
+    <p:extLst>
+      <p:ext uri="{BB962C8B-B14F-4D97-AF65-F5344CB8AC3E}">
+        <p14:creationId xmlns:p14="http://schemas.microsoft.com/office/powerpoint/2010/main" val="3539113236"/>
+      </p:ext>
+    </p:extLst>
+  </p:cSld>
+  <p:clrMapOvr>
+    <a:masterClrMapping/>
+  </p:clrMapOvr>
+</p:sld>
+</file>
+
 <file path=ppt/theme/theme1.xml><?xml version="1.0" encoding="utf-8"?>
 <a:theme xmlns:a="http://schemas.openxmlformats.org/drawingml/2006/main" name="Office Theme">
   <a:themeElements>

</xml_diff>